<commit_message>
added basic mailing functionality
</commit_message>
<xml_diff>
--- a/Java/PageAnalyzer_Workspace/PageAnalyzer/Documentation/PageAnalyzer_Architecture.pptx
+++ b/Java/PageAnalyzer_Workspace/PageAnalyzer/Documentation/PageAnalyzer_Architecture.pptx
@@ -106,7 +106,7 @@
   </p:defaultTextStyle>
   <p:extLst>
     <p:ext uri="{EFAFB233-063F-42B5-8137-9DF3F51BA10A}">
-      <p15:sldGuideLst xmlns:p15="http://schemas.microsoft.com/office/powerpoint/2012/main"/>
+      <p15:sldGuideLst xmlns:p15="http://schemas.microsoft.com/office/powerpoint/2012/main" xmlns=""/>
     </p:ext>
   </p:extLst>
 </p:presentation>
@@ -243,7 +243,7 @@
           <a:p>
             <a:fld id="{485B8429-95BF-4192-89F7-D60C01087E41}" type="datetimeFigureOut">
               <a:rPr lang="de-CH" smtClean="0"/>
-              <a:t>14.03.2018</a:t>
+              <a:t>03.12.2019</a:t>
             </a:fld>
             <a:endParaRPr lang="de-CH"/>
           </a:p>
@@ -285,7 +285,7 @@
           <a:p>
             <a:fld id="{84EEC059-3988-4796-9684-CC38E9989A6A}" type="slidenum">
               <a:rPr lang="de-CH" smtClean="0"/>
-              <a:t>‹#›</a:t>
+              <a:t>‹Nr.›</a:t>
             </a:fld>
             <a:endParaRPr lang="de-CH"/>
           </a:p>
@@ -413,7 +413,7 @@
           <a:p>
             <a:fld id="{485B8429-95BF-4192-89F7-D60C01087E41}" type="datetimeFigureOut">
               <a:rPr lang="de-CH" smtClean="0"/>
-              <a:t>14.03.2018</a:t>
+              <a:t>03.12.2019</a:t>
             </a:fld>
             <a:endParaRPr lang="de-CH"/>
           </a:p>
@@ -455,7 +455,7 @@
           <a:p>
             <a:fld id="{84EEC059-3988-4796-9684-CC38E9989A6A}" type="slidenum">
               <a:rPr lang="de-CH" smtClean="0"/>
-              <a:t>‹#›</a:t>
+              <a:t>‹Nr.›</a:t>
             </a:fld>
             <a:endParaRPr lang="de-CH"/>
           </a:p>
@@ -593,7 +593,7 @@
           <a:p>
             <a:fld id="{485B8429-95BF-4192-89F7-D60C01087E41}" type="datetimeFigureOut">
               <a:rPr lang="de-CH" smtClean="0"/>
-              <a:t>14.03.2018</a:t>
+              <a:t>03.12.2019</a:t>
             </a:fld>
             <a:endParaRPr lang="de-CH"/>
           </a:p>
@@ -635,7 +635,7 @@
           <a:p>
             <a:fld id="{84EEC059-3988-4796-9684-CC38E9989A6A}" type="slidenum">
               <a:rPr lang="de-CH" smtClean="0"/>
-              <a:t>‹#›</a:t>
+              <a:t>‹Nr.›</a:t>
             </a:fld>
             <a:endParaRPr lang="de-CH"/>
           </a:p>
@@ -763,7 +763,7 @@
           <a:p>
             <a:fld id="{485B8429-95BF-4192-89F7-D60C01087E41}" type="datetimeFigureOut">
               <a:rPr lang="de-CH" smtClean="0"/>
-              <a:t>14.03.2018</a:t>
+              <a:t>03.12.2019</a:t>
             </a:fld>
             <a:endParaRPr lang="de-CH"/>
           </a:p>
@@ -805,7 +805,7 @@
           <a:p>
             <a:fld id="{84EEC059-3988-4796-9684-CC38E9989A6A}" type="slidenum">
               <a:rPr lang="de-CH" smtClean="0"/>
-              <a:t>‹#›</a:t>
+              <a:t>‹Nr.›</a:t>
             </a:fld>
             <a:endParaRPr lang="de-CH"/>
           </a:p>
@@ -1009,7 +1009,7 @@
           <a:p>
             <a:fld id="{485B8429-95BF-4192-89F7-D60C01087E41}" type="datetimeFigureOut">
               <a:rPr lang="de-CH" smtClean="0"/>
-              <a:t>14.03.2018</a:t>
+              <a:t>03.12.2019</a:t>
             </a:fld>
             <a:endParaRPr lang="de-CH"/>
           </a:p>
@@ -1051,7 +1051,7 @@
           <a:p>
             <a:fld id="{84EEC059-3988-4796-9684-CC38E9989A6A}" type="slidenum">
               <a:rPr lang="de-CH" smtClean="0"/>
-              <a:t>‹#›</a:t>
+              <a:t>‹Nr.›</a:t>
             </a:fld>
             <a:endParaRPr lang="de-CH"/>
           </a:p>
@@ -1241,7 +1241,7 @@
           <a:p>
             <a:fld id="{485B8429-95BF-4192-89F7-D60C01087E41}" type="datetimeFigureOut">
               <a:rPr lang="de-CH" smtClean="0"/>
-              <a:t>14.03.2018</a:t>
+              <a:t>03.12.2019</a:t>
             </a:fld>
             <a:endParaRPr lang="de-CH"/>
           </a:p>
@@ -1283,7 +1283,7 @@
           <a:p>
             <a:fld id="{84EEC059-3988-4796-9684-CC38E9989A6A}" type="slidenum">
               <a:rPr lang="de-CH" smtClean="0"/>
-              <a:t>‹#›</a:t>
+              <a:t>‹Nr.›</a:t>
             </a:fld>
             <a:endParaRPr lang="de-CH"/>
           </a:p>
@@ -1608,7 +1608,7 @@
           <a:p>
             <a:fld id="{485B8429-95BF-4192-89F7-D60C01087E41}" type="datetimeFigureOut">
               <a:rPr lang="de-CH" smtClean="0"/>
-              <a:t>14.03.2018</a:t>
+              <a:t>03.12.2019</a:t>
             </a:fld>
             <a:endParaRPr lang="de-CH"/>
           </a:p>
@@ -1650,7 +1650,7 @@
           <a:p>
             <a:fld id="{84EEC059-3988-4796-9684-CC38E9989A6A}" type="slidenum">
               <a:rPr lang="de-CH" smtClean="0"/>
-              <a:t>‹#›</a:t>
+              <a:t>‹Nr.›</a:t>
             </a:fld>
             <a:endParaRPr lang="de-CH"/>
           </a:p>
@@ -1726,7 +1726,7 @@
           <a:p>
             <a:fld id="{485B8429-95BF-4192-89F7-D60C01087E41}" type="datetimeFigureOut">
               <a:rPr lang="de-CH" smtClean="0"/>
-              <a:t>14.03.2018</a:t>
+              <a:t>03.12.2019</a:t>
             </a:fld>
             <a:endParaRPr lang="de-CH"/>
           </a:p>
@@ -1768,7 +1768,7 @@
           <a:p>
             <a:fld id="{84EEC059-3988-4796-9684-CC38E9989A6A}" type="slidenum">
               <a:rPr lang="de-CH" smtClean="0"/>
-              <a:t>‹#›</a:t>
+              <a:t>‹Nr.›</a:t>
             </a:fld>
             <a:endParaRPr lang="de-CH"/>
           </a:p>
@@ -1821,7 +1821,7 @@
           <a:p>
             <a:fld id="{485B8429-95BF-4192-89F7-D60C01087E41}" type="datetimeFigureOut">
               <a:rPr lang="de-CH" smtClean="0"/>
-              <a:t>14.03.2018</a:t>
+              <a:t>03.12.2019</a:t>
             </a:fld>
             <a:endParaRPr lang="de-CH"/>
           </a:p>
@@ -1863,7 +1863,7 @@
           <a:p>
             <a:fld id="{84EEC059-3988-4796-9684-CC38E9989A6A}" type="slidenum">
               <a:rPr lang="de-CH" smtClean="0"/>
-              <a:t>‹#›</a:t>
+              <a:t>‹Nr.›</a:t>
             </a:fld>
             <a:endParaRPr lang="de-CH"/>
           </a:p>
@@ -2098,7 +2098,7 @@
           <a:p>
             <a:fld id="{485B8429-95BF-4192-89F7-D60C01087E41}" type="datetimeFigureOut">
               <a:rPr lang="de-CH" smtClean="0"/>
-              <a:t>14.03.2018</a:t>
+              <a:t>03.12.2019</a:t>
             </a:fld>
             <a:endParaRPr lang="de-CH"/>
           </a:p>
@@ -2140,7 +2140,7 @@
           <a:p>
             <a:fld id="{84EEC059-3988-4796-9684-CC38E9989A6A}" type="slidenum">
               <a:rPr lang="de-CH" smtClean="0"/>
-              <a:t>‹#›</a:t>
+              <a:t>‹Nr.›</a:t>
             </a:fld>
             <a:endParaRPr lang="de-CH"/>
           </a:p>
@@ -2351,7 +2351,7 @@
           <a:p>
             <a:fld id="{485B8429-95BF-4192-89F7-D60C01087E41}" type="datetimeFigureOut">
               <a:rPr lang="de-CH" smtClean="0"/>
-              <a:t>14.03.2018</a:t>
+              <a:t>03.12.2019</a:t>
             </a:fld>
             <a:endParaRPr lang="de-CH"/>
           </a:p>
@@ -2393,7 +2393,7 @@
           <a:p>
             <a:fld id="{84EEC059-3988-4796-9684-CC38E9989A6A}" type="slidenum">
               <a:rPr lang="de-CH" smtClean="0"/>
-              <a:t>‹#›</a:t>
+              <a:t>‹Nr.›</a:t>
             </a:fld>
             <a:endParaRPr lang="de-CH"/>
           </a:p>
@@ -2564,7 +2564,7 @@
           <a:p>
             <a:fld id="{485B8429-95BF-4192-89F7-D60C01087E41}" type="datetimeFigureOut">
               <a:rPr lang="de-CH" smtClean="0"/>
-              <a:t>14.03.2018</a:t>
+              <a:t>03.12.2019</a:t>
             </a:fld>
             <a:endParaRPr lang="de-CH"/>
           </a:p>
@@ -2642,7 +2642,7 @@
           <a:p>
             <a:fld id="{84EEC059-3988-4796-9684-CC38E9989A6A}" type="slidenum">
               <a:rPr lang="de-CH" smtClean="0"/>
-              <a:t>‹#›</a:t>
+              <a:t>‹Nr.›</a:t>
             </a:fld>
             <a:endParaRPr lang="de-CH"/>
           </a:p>
@@ -2971,86 +2971,14 @@
       </p:grpSpPr>
       <p:sp>
         <p:nvSpPr>
-          <p:cNvPr id="4" name="Title 3"/>
-          <p:cNvSpPr>
-            <a:spLocks noGrp="1"/>
-          </p:cNvSpPr>
-          <p:nvPr>
-            <p:ph type="title"/>
-          </p:nvPr>
-        </p:nvSpPr>
-        <p:spPr>
-          <a:xfrm>
-            <a:off x="829147" y="184055"/>
-            <a:ext cx="10515600" cy="712237"/>
-          </a:xfrm>
-        </p:spPr>
-        <p:txBody>
-          <a:bodyPr anchor="ctr" anchorCtr="1"/>
-          <a:lstStyle/>
-          <a:p>
-            <a:r>
-              <a:rPr lang="de-CH" dirty="0" smtClean="0">
-                <a:ln w="0"/>
-                <a:effectLst>
-                  <a:outerShdw blurRad="38100" dist="19050" dir="2700000" algn="tl" rotWithShape="0">
-                    <a:schemeClr val="dk1">
-                      <a:alpha val="40000"/>
-                    </a:schemeClr>
-                  </a:outerShdw>
-                </a:effectLst>
-              </a:rPr>
-              <a:t>Page Analyzer </a:t>
-            </a:r>
-            <a:r>
-              <a:rPr lang="de-CH" dirty="0" err="1">
-                <a:ln w="0"/>
-                <a:effectLst>
-                  <a:outerShdw blurRad="38100" dist="19050" dir="2700000" algn="tl" rotWithShape="0">
-                    <a:schemeClr val="dk1">
-                      <a:alpha val="40000"/>
-                    </a:schemeClr>
-                  </a:outerShdw>
-                </a:effectLst>
-              </a:rPr>
-              <a:t>A</a:t>
-            </a:r>
-            <a:r>
-              <a:rPr lang="de-CH" dirty="0" err="1" smtClean="0">
-                <a:ln w="0"/>
-                <a:effectLst>
-                  <a:outerShdw blurRad="38100" dist="19050" dir="2700000" algn="tl" rotWithShape="0">
-                    <a:schemeClr val="dk1">
-                      <a:alpha val="40000"/>
-                    </a:schemeClr>
-                  </a:outerShdw>
-                </a:effectLst>
-              </a:rPr>
-              <a:t>rchitecture</a:t>
-            </a:r>
-            <a:endParaRPr lang="de-CH" dirty="0">
-              <a:ln w="0"/>
-              <a:effectLst>
-                <a:outerShdw blurRad="38100" dist="19050" dir="2700000" algn="tl" rotWithShape="0">
-                  <a:schemeClr val="dk1">
-                    <a:alpha val="40000"/>
-                  </a:schemeClr>
-                </a:outerShdw>
-              </a:effectLst>
-            </a:endParaRPr>
-          </a:p>
-        </p:txBody>
-      </p:sp>
-      <p:sp>
-        <p:nvSpPr>
-          <p:cNvPr id="6" name="Rectangle 5"/>
+          <p:cNvPr id="30" name="Rectangle 7"/>
           <p:cNvSpPr/>
           <p:nvPr/>
         </p:nvSpPr>
         <p:spPr>
           <a:xfrm>
-            <a:off x="616714" y="1048262"/>
-            <a:ext cx="3574285" cy="5385195"/>
+            <a:off x="4470257" y="4271428"/>
+            <a:ext cx="3574285" cy="2162030"/>
           </a:xfrm>
           <a:prstGeom prst="rect">
             <a:avLst/>
@@ -3084,13 +3012,13 @@
           </a:fontRef>
         </p:style>
         <p:txBody>
-          <a:bodyPr rtlCol="0" anchor="t" anchorCtr="0"/>
+          <a:bodyPr rtlCol="0" anchor="b" anchorCtr="0"/>
           <a:lstStyle/>
           <a:p>
             <a:pPr algn="ctr"/>
             <a:r>
               <a:rPr lang="de-CH" dirty="0" smtClean="0"/>
-              <a:t>Browser</a:t>
+              <a:t>Database Server </a:t>
             </a:r>
             <a:endParaRPr lang="de-CH" dirty="0"/>
           </a:p>
@@ -3098,13 +3026,85 @@
       </p:sp>
       <p:sp>
         <p:nvSpPr>
-          <p:cNvPr id="7" name="Rectangle 6"/>
+          <p:cNvPr id="4" name="Title 3"/>
+          <p:cNvSpPr>
+            <a:spLocks noGrp="1"/>
+          </p:cNvSpPr>
+          <p:nvPr>
+            <p:ph type="title"/>
+          </p:nvPr>
+        </p:nvSpPr>
+        <p:spPr>
+          <a:xfrm>
+            <a:off x="829147" y="184055"/>
+            <a:ext cx="10515600" cy="712237"/>
+          </a:xfrm>
+        </p:spPr>
+        <p:txBody>
+          <a:bodyPr anchor="ctr" anchorCtr="1"/>
+          <a:lstStyle/>
+          <a:p>
+            <a:r>
+              <a:rPr lang="de-CH" dirty="0" smtClean="0">
+                <a:ln w="0"/>
+                <a:effectLst>
+                  <a:outerShdw blurRad="38100" dist="19050" dir="2700000" algn="tl" rotWithShape="0">
+                    <a:schemeClr val="dk1">
+                      <a:alpha val="40000"/>
+                    </a:schemeClr>
+                  </a:outerShdw>
+                </a:effectLst>
+              </a:rPr>
+              <a:t>Page Analyzer </a:t>
+            </a:r>
+            <a:r>
+              <a:rPr lang="de-CH" dirty="0" err="1">
+                <a:ln w="0"/>
+                <a:effectLst>
+                  <a:outerShdw blurRad="38100" dist="19050" dir="2700000" algn="tl" rotWithShape="0">
+                    <a:schemeClr val="dk1">
+                      <a:alpha val="40000"/>
+                    </a:schemeClr>
+                  </a:outerShdw>
+                </a:effectLst>
+              </a:rPr>
+              <a:t>A</a:t>
+            </a:r>
+            <a:r>
+              <a:rPr lang="de-CH" dirty="0" err="1" smtClean="0">
+                <a:ln w="0"/>
+                <a:effectLst>
+                  <a:outerShdw blurRad="38100" dist="19050" dir="2700000" algn="tl" rotWithShape="0">
+                    <a:schemeClr val="dk1">
+                      <a:alpha val="40000"/>
+                    </a:schemeClr>
+                  </a:outerShdw>
+                </a:effectLst>
+              </a:rPr>
+              <a:t>rchitecture</a:t>
+            </a:r>
+            <a:endParaRPr lang="de-CH" dirty="0">
+              <a:ln w="0"/>
+              <a:effectLst>
+                <a:outerShdw blurRad="38100" dist="19050" dir="2700000" algn="tl" rotWithShape="0">
+                  <a:schemeClr val="dk1">
+                    <a:alpha val="40000"/>
+                  </a:schemeClr>
+                </a:outerShdw>
+              </a:effectLst>
+            </a:endParaRPr>
+          </a:p>
+        </p:txBody>
+      </p:sp>
+      <p:sp>
+        <p:nvSpPr>
+          <p:cNvPr id="6" name="Rectangle 5"/>
           <p:cNvSpPr/>
           <p:nvPr/>
         </p:nvSpPr>
         <p:spPr>
           <a:xfrm>
-            <a:off x="4470257" y="1048262"/>
+            <a:off x="616714" y="1048262"/>
             <a:ext cx="3574285" cy="5385195"/>
           </a:xfrm>
           <a:prstGeom prst="rect">
@@ -3145,7 +3145,7 @@
             <a:pPr algn="ctr"/>
             <a:r>
               <a:rPr lang="de-CH" dirty="0" smtClean="0"/>
-              <a:t>Java Webserver</a:t>
+              <a:t>Browser</a:t>
             </a:r>
             <a:endParaRPr lang="de-CH" dirty="0"/>
           </a:p>
@@ -3153,14 +3153,14 @@
       </p:sp>
       <p:sp>
         <p:nvSpPr>
-          <p:cNvPr id="8" name="Rectangle 7"/>
+          <p:cNvPr id="7" name="Rectangle 6"/>
           <p:cNvSpPr/>
           <p:nvPr/>
         </p:nvSpPr>
         <p:spPr>
           <a:xfrm>
-            <a:off x="8323800" y="1048262"/>
-            <a:ext cx="3574285" cy="5385195"/>
+            <a:off x="4470257" y="1048262"/>
+            <a:ext cx="3574285" cy="3123123"/>
           </a:xfrm>
           <a:prstGeom prst="rect">
             <a:avLst/>
@@ -3199,10 +3199,65 @@
           <a:p>
             <a:pPr algn="ctr"/>
             <a:r>
-              <a:rPr lang="de-CH" dirty="0" err="1" smtClean="0"/>
+              <a:rPr lang="de-CH" dirty="0" smtClean="0"/>
+              <a:t>Java Webserver</a:t>
+            </a:r>
+            <a:endParaRPr lang="de-CH" dirty="0"/>
+          </a:p>
+        </p:txBody>
+      </p:sp>
+      <p:sp>
+        <p:nvSpPr>
+          <p:cNvPr id="8" name="Rectangle 7"/>
+          <p:cNvSpPr/>
+          <p:nvPr/>
+        </p:nvSpPr>
+        <p:spPr>
+          <a:xfrm>
+            <a:off x="8323800" y="1048262"/>
+            <a:ext cx="3574285" cy="2435167"/>
+          </a:xfrm>
+          <a:prstGeom prst="rect">
+            <a:avLst/>
+          </a:prstGeom>
+          <a:solidFill>
+            <a:schemeClr val="accent1">
+              <a:alpha val="50000"/>
+            </a:schemeClr>
+          </a:solidFill>
+          <a:ln>
+            <a:solidFill>
+              <a:schemeClr val="accent1">
+                <a:lumMod val="75000"/>
+              </a:schemeClr>
+            </a:solidFill>
+            <a:prstDash val="dash"/>
+          </a:ln>
+        </p:spPr>
+        <p:style>
+          <a:lnRef idx="0">
+            <a:scrgbClr r="0" g="0" b="0"/>
+          </a:lnRef>
+          <a:fillRef idx="0">
+            <a:scrgbClr r="0" g="0" b="0"/>
+          </a:fillRef>
+          <a:effectRef idx="0">
+            <a:scrgbClr r="0" g="0" b="0"/>
+          </a:effectRef>
+          <a:fontRef idx="minor">
+            <a:schemeClr val="lt1"/>
+          </a:fontRef>
+        </p:style>
+        <p:txBody>
+          <a:bodyPr rtlCol="0" anchor="t" anchorCtr="0"/>
+          <a:lstStyle/>
+          <a:p>
+            <a:pPr algn="ctr"/>
+            <a:r>
+              <a:rPr lang="en-US" noProof="1" smtClean="0"/>
               <a:t>NodeJS</a:t>
             </a:r>
-            <a:endParaRPr lang="de-CH" dirty="0"/>
+            <a:endParaRPr lang="en-US" noProof="1"/>
           </a:p>
         </p:txBody>
       </p:sp>
@@ -3288,7 +3343,11 @@
             <a:pPr algn="ctr"/>
             <a:r>
               <a:rPr lang="de-CH" dirty="0" smtClean="0"/>
-              <a:t>.har-File Upload</a:t>
+              <a:t>/</a:t>
+            </a:r>
+            <a:r>
+              <a:rPr lang="de-CH" dirty="0" err="1" smtClean="0"/>
+              <a:t>harupload</a:t>
             </a:r>
             <a:endParaRPr lang="de-CH" dirty="0"/>
           </a:p>
@@ -3354,7 +3413,7 @@
         <p:spPr>
           <a:xfrm>
             <a:off x="9783431" y="2037510"/>
-            <a:ext cx="1961315" cy="4164627"/>
+            <a:ext cx="1961315" cy="1075801"/>
           </a:xfrm>
           <a:prstGeom prst="rect">
             <a:avLst/>
@@ -3382,14 +3441,10 @@
           <a:p>
             <a:pPr algn="ctr"/>
             <a:r>
-              <a:rPr lang="de-CH" dirty="0" err="1" smtClean="0"/>
-              <a:t>Customized</a:t>
-            </a:r>
-            <a:r>
-              <a:rPr lang="de-CH" dirty="0" smtClean="0"/>
-              <a:t> yslow.js</a:t>
-            </a:r>
-            <a:endParaRPr lang="de-CH" dirty="0"/>
+              <a:rPr lang="en-US" dirty="0" smtClean="0"/>
+              <a:t>Customized yslow.js</a:t>
+            </a:r>
+            <a:endParaRPr lang="en-US" dirty="0"/>
           </a:p>
         </p:txBody>
       </p:sp>
@@ -3436,8 +3491,8 @@
         </p:nvSpPr>
         <p:spPr>
           <a:xfrm>
-            <a:off x="5242198" y="5566265"/>
-            <a:ext cx="1961315" cy="635873"/>
+            <a:off x="5242197" y="4906108"/>
+            <a:ext cx="1961315" cy="984738"/>
           </a:xfrm>
           <a:prstGeom prst="rect">
             <a:avLst/>
@@ -3466,58 +3521,7 @@
             <a:pPr algn="ctr"/>
             <a:r>
               <a:rPr lang="de-CH" dirty="0" smtClean="0"/>
-              <a:t>HAR Download</a:t>
-            </a:r>
-            <a:br>
-              <a:rPr lang="de-CH" dirty="0" smtClean="0"/>
-            </a:br>
-            <a:r>
-              <a:rPr lang="de-CH" dirty="0" smtClean="0"/>
-              <a:t>Servlet</a:t>
-            </a:r>
-            <a:endParaRPr lang="de-CH" dirty="0"/>
-          </a:p>
-        </p:txBody>
-      </p:sp>
-      <p:sp>
-        <p:nvSpPr>
-          <p:cNvPr id="18" name="Rectangle 17"/>
-          <p:cNvSpPr/>
-          <p:nvPr/>
-        </p:nvSpPr>
-        <p:spPr>
-          <a:xfrm>
-            <a:off x="5242198" y="4482006"/>
-            <a:ext cx="1961316" cy="317937"/>
-          </a:xfrm>
-          <a:prstGeom prst="rect">
-            <a:avLst/>
-          </a:prstGeom>
-        </p:spPr>
-        <p:style>
-          <a:lnRef idx="2">
-            <a:schemeClr val="accent1">
-              <a:shade val="50000"/>
-            </a:schemeClr>
-          </a:lnRef>
-          <a:fillRef idx="1">
-            <a:schemeClr val="accent1"/>
-          </a:fillRef>
-          <a:effectRef idx="0">
-            <a:schemeClr val="accent1"/>
-          </a:effectRef>
-          <a:fontRef idx="minor">
-            <a:schemeClr val="lt1"/>
-          </a:fontRef>
-        </p:style>
-        <p:txBody>
-          <a:bodyPr rtlCol="0" anchor="ctr"/>
-          <a:lstStyle/>
-          <a:p>
-            <a:pPr algn="ctr"/>
-            <a:r>
-              <a:rPr lang="de-CH" dirty="0" smtClean="0"/>
-              <a:t>Cache</a:t>
+              <a:t>H2 Database</a:t>
             </a:r>
             <a:endParaRPr lang="de-CH" dirty="0"/>
           </a:p>
@@ -3528,50 +3532,13 @@
           <p:cNvPr id="20" name="Straight Arrow Connector 19"/>
           <p:cNvCxnSpPr>
             <a:stCxn id="12" idx="2"/>
-            <a:endCxn id="18" idx="0"/>
           </p:cNvCxnSpPr>
           <p:nvPr/>
         </p:nvCxnSpPr>
         <p:spPr>
-          <a:xfrm flipH="1">
-            <a:off x="6222856" y="3483429"/>
-            <a:ext cx="1" cy="998577"/>
-          </a:xfrm>
-          <a:prstGeom prst="straightConnector1">
-            <a:avLst/>
-          </a:prstGeom>
-          <a:ln w="57150">
-            <a:tailEnd type="stealth"/>
-          </a:ln>
-        </p:spPr>
-        <p:style>
-          <a:lnRef idx="1">
-            <a:schemeClr val="accent1"/>
-          </a:lnRef>
-          <a:fillRef idx="0">
-            <a:schemeClr val="accent1"/>
-          </a:fillRef>
-          <a:effectRef idx="0">
-            <a:schemeClr val="accent1"/>
-          </a:effectRef>
-          <a:fontRef idx="minor">
-            <a:schemeClr val="tx1"/>
-          </a:fontRef>
-        </p:style>
-      </p:cxnSp>
-      <p:cxnSp>
-        <p:nvCxnSpPr>
-          <p:cNvPr id="23" name="Straight Arrow Connector 22"/>
-          <p:cNvCxnSpPr>
-            <a:stCxn id="17" idx="0"/>
-            <a:endCxn id="18" idx="2"/>
-          </p:cNvCxnSpPr>
-          <p:nvPr/>
-        </p:nvCxnSpPr>
-        <p:spPr>
-          <a:xfrm flipV="1">
-            <a:off x="6222856" y="4799943"/>
-            <a:ext cx="0" cy="766322"/>
+          <a:xfrm>
+            <a:off x="6222857" y="3483429"/>
+            <a:ext cx="0" cy="1422679"/>
           </a:xfrm>
           <a:prstGeom prst="straightConnector1">
             <a:avLst/>
@@ -3663,16 +3630,126 @@
           </a:fontRef>
         </p:style>
       </p:cxnSp>
+      <p:sp>
+        <p:nvSpPr>
+          <p:cNvPr id="42" name="TextBox 41"/>
+          <p:cNvSpPr txBox="1"/>
+          <p:nvPr/>
+        </p:nvSpPr>
+        <p:spPr>
+          <a:xfrm>
+            <a:off x="3043295" y="1804563"/>
+            <a:ext cx="1045479" cy="430887"/>
+          </a:xfrm>
+          <a:prstGeom prst="rect">
+            <a:avLst/>
+          </a:prstGeom>
+          <a:noFill/>
+        </p:spPr>
+        <p:txBody>
+          <a:bodyPr wrap="none" rtlCol="0">
+            <a:spAutoFit/>
+          </a:bodyPr>
+          <a:lstStyle/>
+          <a:p>
+            <a:r>
+              <a:rPr lang="en-US" sz="1100" dirty="0" smtClean="0"/>
+              <a:t>1. Upload HAR</a:t>
+            </a:r>
+            <a:br>
+              <a:rPr lang="en-US" sz="1100" dirty="0" smtClean="0"/>
+            </a:br>
+            <a:r>
+              <a:rPr lang="en-US" sz="1100" dirty="0" smtClean="0"/>
+              <a:t>to web server</a:t>
+            </a:r>
+            <a:endParaRPr lang="en-US" sz="1100" dirty="0"/>
+          </a:p>
+        </p:txBody>
+      </p:sp>
+      <p:sp>
+        <p:nvSpPr>
+          <p:cNvPr id="43" name="TextBox 42"/>
+          <p:cNvSpPr txBox="1"/>
+          <p:nvPr/>
+        </p:nvSpPr>
+        <p:spPr>
+          <a:xfrm>
+            <a:off x="6294846" y="3676707"/>
+            <a:ext cx="1138453" cy="430887"/>
+          </a:xfrm>
+          <a:prstGeom prst="rect">
+            <a:avLst/>
+          </a:prstGeom>
+          <a:noFill/>
+        </p:spPr>
+        <p:txBody>
+          <a:bodyPr wrap="none" rtlCol="0">
+            <a:spAutoFit/>
+          </a:bodyPr>
+          <a:lstStyle/>
+          <a:p>
+            <a:r>
+              <a:rPr lang="en-US" sz="1100" dirty="0" smtClean="0"/>
+              <a:t>5. Store HAR File</a:t>
+            </a:r>
+            <a:br>
+              <a:rPr lang="en-US" sz="1100" dirty="0" smtClean="0"/>
+            </a:br>
+            <a:r>
+              <a:rPr lang="en-US" sz="1100" dirty="0" smtClean="0"/>
+              <a:t>and result in DB</a:t>
+            </a:r>
+            <a:endParaRPr lang="en-US" sz="1100" dirty="0"/>
+          </a:p>
+        </p:txBody>
+      </p:sp>
+      <p:sp>
+        <p:nvSpPr>
+          <p:cNvPr id="44" name="TextBox 43"/>
+          <p:cNvSpPr txBox="1"/>
+          <p:nvPr/>
+        </p:nvSpPr>
+        <p:spPr>
+          <a:xfrm>
+            <a:off x="8472691" y="1780799"/>
+            <a:ext cx="1104790" cy="430887"/>
+          </a:xfrm>
+          <a:prstGeom prst="rect">
+            <a:avLst/>
+          </a:prstGeom>
+          <a:noFill/>
+        </p:spPr>
+        <p:txBody>
+          <a:bodyPr wrap="none" rtlCol="0">
+            <a:spAutoFit/>
+          </a:bodyPr>
+          <a:lstStyle/>
+          <a:p>
+            <a:r>
+              <a:rPr lang="en-US" sz="1100" noProof="1" smtClean="0"/>
+              <a:t>3. Send Request</a:t>
+            </a:r>
+          </a:p>
+          <a:p>
+            <a:r>
+              <a:rPr lang="en-US" sz="1100" noProof="1" smtClean="0"/>
+              <a:t>to YSlow</a:t>
+            </a:r>
+            <a:endParaRPr lang="en-US" sz="1100" noProof="1"/>
+          </a:p>
+        </p:txBody>
+      </p:sp>
       <p:cxnSp>
         <p:nvCxnSpPr>
-          <p:cNvPr id="37" name="Straight Arrow Connector 36"/>
+          <p:cNvPr id="51" name="Straight Arrow Connector 50"/>
           <p:cNvCxnSpPr/>
           <p:nvPr/>
         </p:nvCxnSpPr>
         <p:spPr>
           <a:xfrm flipH="1">
-            <a:off x="7203513" y="5720911"/>
-            <a:ext cx="2579918" cy="1"/>
+            <a:off x="7203513" y="2485611"/>
+            <a:ext cx="2579918" cy="0"/>
           </a:xfrm>
           <a:prstGeom prst="straightConnector1">
             <a:avLst/>
@@ -3698,14 +3775,14 @@
       </p:cxnSp>
       <p:sp>
         <p:nvSpPr>
-          <p:cNvPr id="42" name="TextBox 41"/>
+          <p:cNvPr id="56" name="TextBox 55"/>
           <p:cNvSpPr txBox="1"/>
           <p:nvPr/>
         </p:nvSpPr>
         <p:spPr>
           <a:xfrm>
-            <a:off x="3043295" y="1804563"/>
-            <a:ext cx="1045479" cy="430887"/>
+            <a:off x="8502165" y="2565031"/>
+            <a:ext cx="1214586" cy="600164"/>
           </a:xfrm>
           <a:prstGeom prst="rect">
             <a:avLst/>
@@ -3713,44 +3790,33 @@
           <a:noFill/>
         </p:spPr>
         <p:txBody>
-          <a:bodyPr wrap="none" rtlCol="0">
+          <a:bodyPr wrap="square" rtlCol="0">
             <a:spAutoFit/>
           </a:bodyPr>
           <a:lstStyle/>
           <a:p>
             <a:r>
-              <a:rPr lang="de-CH" sz="1100" dirty="0" smtClean="0"/>
-              <a:t>1. Upload HAR</a:t>
-            </a:r>
-            <a:br>
-              <a:rPr lang="de-CH" sz="1100" dirty="0" smtClean="0"/>
-            </a:br>
-            <a:r>
-              <a:rPr lang="de-CH" sz="1100" dirty="0" err="1" smtClean="0"/>
-              <a:t>to</a:t>
-            </a:r>
-            <a:r>
-              <a:rPr lang="de-CH" sz="1100" dirty="0" smtClean="0"/>
-              <a:t> web </a:t>
-            </a:r>
-            <a:r>
-              <a:rPr lang="de-CH" sz="1100" dirty="0" err="1" smtClean="0"/>
-              <a:t>server</a:t>
-            </a:r>
-            <a:endParaRPr lang="de-CH" sz="1100" dirty="0"/>
-          </a:p>
-        </p:txBody>
-      </p:sp>
-      <p:sp>
-        <p:nvSpPr>
-          <p:cNvPr id="43" name="TextBox 42"/>
+              <a:rPr lang="en-US" sz="1100" dirty="0" smtClean="0"/>
+              <a:t>4</a:t>
+            </a:r>
+            <a:r>
+              <a:rPr lang="en-US" sz="1100" dirty="0" smtClean="0"/>
+              <a:t>. Compute and return results as JSON</a:t>
+            </a:r>
+            <a:endParaRPr lang="en-US" sz="1100" dirty="0"/>
+          </a:p>
+        </p:txBody>
+      </p:sp>
+      <p:sp>
+        <p:nvSpPr>
+          <p:cNvPr id="58" name="TextBox 57"/>
           <p:cNvSpPr txBox="1"/>
           <p:nvPr/>
         </p:nvSpPr>
         <p:spPr>
           <a:xfrm>
-            <a:off x="6294846" y="3676707"/>
-            <a:ext cx="1138453" cy="430887"/>
+            <a:off x="3061099" y="2644164"/>
+            <a:ext cx="1214586" cy="600164"/>
           </a:xfrm>
           <a:prstGeom prst="rect">
             <a:avLst/>
@@ -3758,84 +3824,42 @@
           <a:noFill/>
         </p:spPr>
         <p:txBody>
-          <a:bodyPr wrap="none" rtlCol="0">
+          <a:bodyPr wrap="square" rtlCol="0">
             <a:spAutoFit/>
           </a:bodyPr>
           <a:lstStyle/>
           <a:p>
             <a:r>
-              <a:rPr lang="de-CH" sz="1100" dirty="0" smtClean="0"/>
-              <a:t>2. Store HAR File</a:t>
+              <a:rPr lang="en-US" sz="1100" dirty="0" smtClean="0"/>
+              <a:t>6</a:t>
+            </a:r>
+            <a:r>
+              <a:rPr lang="en-US" sz="1100" dirty="0" smtClean="0"/>
+              <a:t>. Return HTML including JSON</a:t>
             </a:r>
             <a:br>
-              <a:rPr lang="de-CH" sz="1100" dirty="0" smtClean="0"/>
+              <a:rPr lang="en-US" sz="1100" dirty="0" smtClean="0"/>
             </a:br>
             <a:r>
-              <a:rPr lang="de-CH" sz="1100" dirty="0" smtClean="0"/>
-              <a:t>in a </a:t>
-            </a:r>
-            <a:r>
-              <a:rPr lang="de-CH" sz="1100" dirty="0" err="1" smtClean="0"/>
-              <a:t>cache</a:t>
-            </a:r>
-            <a:endParaRPr lang="de-CH" sz="1100" dirty="0"/>
-          </a:p>
-        </p:txBody>
-      </p:sp>
-      <p:sp>
-        <p:nvSpPr>
-          <p:cNvPr id="44" name="TextBox 43"/>
-          <p:cNvSpPr txBox="1"/>
-          <p:nvPr/>
-        </p:nvSpPr>
-        <p:spPr>
-          <a:xfrm>
-            <a:off x="8472691" y="1780799"/>
-            <a:ext cx="1104790" cy="430887"/>
-          </a:xfrm>
-          <a:prstGeom prst="rect">
-            <a:avLst/>
-          </a:prstGeom>
-          <a:noFill/>
-        </p:spPr>
-        <p:txBody>
-          <a:bodyPr wrap="none" rtlCol="0">
-            <a:spAutoFit/>
-          </a:bodyPr>
-          <a:lstStyle/>
-          <a:p>
-            <a:r>
-              <a:rPr lang="de-CH" sz="1100" dirty="0" smtClean="0"/>
-              <a:t>3. Send Request</a:t>
-            </a:r>
-          </a:p>
-          <a:p>
-            <a:r>
-              <a:rPr lang="de-CH" sz="1100" dirty="0" err="1" smtClean="0"/>
-              <a:t>to</a:t>
-            </a:r>
-            <a:r>
-              <a:rPr lang="de-CH" sz="1100" dirty="0" smtClean="0"/>
-              <a:t> </a:t>
-            </a:r>
-            <a:r>
-              <a:rPr lang="de-CH" sz="1100" dirty="0" err="1" smtClean="0"/>
-              <a:t>YSlow</a:t>
-            </a:r>
-            <a:endParaRPr lang="de-CH" sz="1100" dirty="0"/>
+              <a:rPr lang="en-US" sz="1100" dirty="0" smtClean="0"/>
+              <a:t>results</a:t>
+            </a:r>
+            <a:endParaRPr lang="en-US" sz="1100" dirty="0"/>
           </a:p>
         </p:txBody>
       </p:sp>
       <p:cxnSp>
         <p:nvCxnSpPr>
-          <p:cNvPr id="47" name="Straight Arrow Connector 46"/>
-          <p:cNvCxnSpPr/>
+          <p:cNvPr id="59" name="Straight Arrow Connector 58"/>
+          <p:cNvCxnSpPr>
+            <a:stCxn id="10" idx="2"/>
+          </p:cNvCxnSpPr>
           <p:nvPr/>
         </p:nvCxnSpPr>
         <p:spPr>
           <a:xfrm>
-            <a:off x="7203513" y="5884201"/>
-            <a:ext cx="2579918" cy="0"/>
+            <a:off x="1892224" y="3494311"/>
+            <a:ext cx="1890" cy="1050888"/>
           </a:xfrm>
           <a:prstGeom prst="straightConnector1">
             <a:avLst/>
@@ -3861,14 +3885,14 @@
       </p:cxnSp>
       <p:sp>
         <p:nvSpPr>
-          <p:cNvPr id="50" name="TextBox 49"/>
+          <p:cNvPr id="64" name="TextBox 63"/>
           <p:cNvSpPr txBox="1"/>
           <p:nvPr/>
         </p:nvSpPr>
         <p:spPr>
           <a:xfrm>
-            <a:off x="8385603" y="5198417"/>
-            <a:ext cx="1342034" cy="430887"/>
+            <a:off x="2035659" y="3683267"/>
+            <a:ext cx="1507554" cy="600164"/>
           </a:xfrm>
           <a:prstGeom prst="rect">
             <a:avLst/>
@@ -3876,93 +3900,140 @@
           <a:noFill/>
         </p:spPr>
         <p:txBody>
-          <a:bodyPr wrap="none" rtlCol="0">
+          <a:bodyPr wrap="square" rtlCol="0">
             <a:spAutoFit/>
           </a:bodyPr>
           <a:lstStyle/>
           <a:p>
             <a:r>
-              <a:rPr lang="de-CH" sz="1100" dirty="0" smtClean="0"/>
-              <a:t>4. </a:t>
-            </a:r>
-            <a:r>
-              <a:rPr lang="de-CH" sz="1100" dirty="0" err="1" smtClean="0"/>
-              <a:t>Retrieve</a:t>
-            </a:r>
-            <a:r>
-              <a:rPr lang="de-CH" sz="1100" dirty="0" smtClean="0"/>
-              <a:t> HAR</a:t>
-            </a:r>
-            <a:br>
-              <a:rPr lang="de-CH" sz="1100" dirty="0" smtClean="0"/>
-            </a:br>
-            <a:r>
-              <a:rPr lang="de-CH" sz="1100" dirty="0" err="1" smtClean="0"/>
-              <a:t>file</a:t>
-            </a:r>
-            <a:r>
-              <a:rPr lang="de-CH" sz="1100" dirty="0" smtClean="0"/>
-              <a:t> </a:t>
-            </a:r>
-            <a:r>
-              <a:rPr lang="de-CH" sz="1100" dirty="0" err="1" smtClean="0"/>
-              <a:t>from</a:t>
-            </a:r>
-            <a:r>
-              <a:rPr lang="de-CH" sz="1100" dirty="0" smtClean="0"/>
-              <a:t> web </a:t>
-            </a:r>
-            <a:r>
-              <a:rPr lang="de-CH" sz="1100" dirty="0" err="1" smtClean="0"/>
-              <a:t>server</a:t>
-            </a:r>
-            <a:endParaRPr lang="de-CH" sz="1100" dirty="0"/>
-          </a:p>
-        </p:txBody>
-      </p:sp>
-      <p:cxnSp>
-        <p:nvCxnSpPr>
-          <p:cNvPr id="51" name="Straight Arrow Connector 50"/>
-          <p:cNvCxnSpPr/>
+              <a:rPr lang="en-US" sz="1100" dirty="0" smtClean="0"/>
+              <a:t>7</a:t>
+            </a:r>
+            <a:r>
+              <a:rPr lang="en-US" sz="1100" dirty="0" smtClean="0"/>
+              <a:t>. Render Page with JavaScript based on the JSON Results</a:t>
+            </a:r>
+            <a:endParaRPr lang="en-US" sz="1100" dirty="0"/>
+          </a:p>
+        </p:txBody>
+      </p:sp>
+      <p:sp>
+        <p:nvSpPr>
+          <p:cNvPr id="38" name="Rectangle 7"/>
+          <p:cNvSpPr/>
           <p:nvPr/>
-        </p:nvCxnSpPr>
-        <p:spPr>
-          <a:xfrm flipH="1">
-            <a:off x="7203513" y="2485611"/>
-            <a:ext cx="2579918" cy="0"/>
-          </a:xfrm>
-          <a:prstGeom prst="straightConnector1">
+        </p:nvSpPr>
+        <p:spPr>
+          <a:xfrm>
+            <a:off x="8322861" y="3571221"/>
+            <a:ext cx="3574285" cy="2862236"/>
+          </a:xfrm>
+          <a:prstGeom prst="rect">
             <a:avLst/>
           </a:prstGeom>
-          <a:ln w="57150">
-            <a:tailEnd type="stealth"/>
+          <a:solidFill>
+            <a:schemeClr val="accent1">
+              <a:alpha val="50000"/>
+            </a:schemeClr>
+          </a:solidFill>
+          <a:ln>
+            <a:solidFill>
+              <a:schemeClr val="accent1">
+                <a:lumMod val="75000"/>
+              </a:schemeClr>
+            </a:solidFill>
+            <a:prstDash val="dash"/>
           </a:ln>
         </p:spPr>
         <p:style>
-          <a:lnRef idx="1">
-            <a:schemeClr val="accent1"/>
+          <a:lnRef idx="0">
+            <a:scrgbClr r="0" g="0" b="0"/>
           </a:lnRef>
           <a:fillRef idx="0">
+            <a:scrgbClr r="0" g="0" b="0"/>
+          </a:fillRef>
+          <a:effectRef idx="0">
+            <a:scrgbClr r="0" g="0" b="0"/>
+          </a:effectRef>
+          <a:fontRef idx="minor">
+            <a:schemeClr val="lt1"/>
+          </a:fontRef>
+        </p:style>
+        <p:txBody>
+          <a:bodyPr rtlCol="0" anchor="t" anchorCtr="0"/>
+          <a:lstStyle/>
+          <a:p>
+            <a:pPr algn="ctr"/>
+            <a:r>
+              <a:rPr lang="de-CH" dirty="0" smtClean="0"/>
+              <a:t>Phantom</a:t>
+            </a:r>
+            <a:r>
+              <a:rPr lang="de-CH" dirty="0" smtClean="0"/>
+              <a:t>JS.exe</a:t>
+            </a:r>
+            <a:endParaRPr lang="de-CH" dirty="0"/>
+          </a:p>
+        </p:txBody>
+      </p:sp>
+      <p:sp>
+        <p:nvSpPr>
+          <p:cNvPr id="39" name="Rectangle 12"/>
+          <p:cNvSpPr/>
+          <p:nvPr/>
+        </p:nvSpPr>
+        <p:spPr>
+          <a:xfrm>
+            <a:off x="9109457" y="5002339"/>
+            <a:ext cx="1961315" cy="1075801"/>
+          </a:xfrm>
+          <a:prstGeom prst="rect">
+            <a:avLst/>
+          </a:prstGeom>
+        </p:spPr>
+        <p:style>
+          <a:lnRef idx="2">
+            <a:schemeClr val="accent1">
+              <a:shade val="50000"/>
+            </a:schemeClr>
+          </a:lnRef>
+          <a:fillRef idx="1">
             <a:schemeClr val="accent1"/>
           </a:fillRef>
           <a:effectRef idx="0">
             <a:schemeClr val="accent1"/>
           </a:effectRef>
           <a:fontRef idx="minor">
-            <a:schemeClr val="tx1"/>
+            <a:schemeClr val="lt1"/>
           </a:fontRef>
         </p:style>
-      </p:cxnSp>
-      <p:sp>
-        <p:nvSpPr>
-          <p:cNvPr id="56" name="TextBox 55"/>
+        <p:txBody>
+          <a:bodyPr rtlCol="0" anchor="ctr"/>
+          <a:lstStyle/>
+          <a:p>
+            <a:pPr algn="ctr"/>
+            <a:r>
+              <a:rPr lang="de-CH" dirty="0" smtClean="0"/>
+              <a:t>netsniff</a:t>
+            </a:r>
+            <a:r>
+              <a:rPr lang="de-CH" dirty="0" smtClean="0"/>
+              <a:t>.js</a:t>
+            </a:r>
+            <a:endParaRPr lang="de-CH" dirty="0"/>
+          </a:p>
+        </p:txBody>
+      </p:sp>
+      <p:sp>
+        <p:nvSpPr>
+          <p:cNvPr id="21" name="Textfeld 20"/>
           <p:cNvSpPr txBox="1"/>
           <p:nvPr/>
         </p:nvSpPr>
         <p:spPr>
           <a:xfrm>
-            <a:off x="8502165" y="2565031"/>
-            <a:ext cx="1214586" cy="600164"/>
+            <a:off x="8502165" y="4035669"/>
+            <a:ext cx="3121266" cy="738664"/>
           </a:xfrm>
           <a:prstGeom prst="rect">
             <a:avLst/>
@@ -3976,288 +4047,77 @@
           <a:lstStyle/>
           <a:p>
             <a:r>
-              <a:rPr lang="de-CH" sz="1100" dirty="0" smtClean="0"/>
-              <a:t>6. </a:t>
-            </a:r>
-            <a:r>
-              <a:rPr lang="de-CH" sz="1100" dirty="0" err="1" smtClean="0"/>
-              <a:t>Compute</a:t>
-            </a:r>
-            <a:r>
-              <a:rPr lang="de-CH" sz="1100" dirty="0" smtClean="0"/>
-              <a:t> </a:t>
-            </a:r>
-            <a:r>
-              <a:rPr lang="de-CH" sz="1100" dirty="0" err="1" smtClean="0"/>
-              <a:t>and</a:t>
-            </a:r>
-            <a:r>
-              <a:rPr lang="de-CH" sz="1100" dirty="0" smtClean="0"/>
-              <a:t> </a:t>
-            </a:r>
-            <a:r>
-              <a:rPr lang="de-CH" sz="1100" dirty="0" err="1" smtClean="0"/>
-              <a:t>return</a:t>
-            </a:r>
-            <a:r>
-              <a:rPr lang="de-CH" sz="1100" dirty="0" smtClean="0"/>
-              <a:t> </a:t>
-            </a:r>
-            <a:r>
-              <a:rPr lang="de-CH" sz="1100" dirty="0" err="1" smtClean="0"/>
-              <a:t>results</a:t>
-            </a:r>
-            <a:r>
-              <a:rPr lang="de-CH" sz="1100" dirty="0" smtClean="0"/>
-              <a:t> </a:t>
-            </a:r>
-            <a:r>
-              <a:rPr lang="de-CH" sz="1100" dirty="0" err="1" smtClean="0"/>
-              <a:t>as</a:t>
-            </a:r>
-            <a:r>
-              <a:rPr lang="de-CH" sz="1100" dirty="0" smtClean="0"/>
-              <a:t> JSON</a:t>
-            </a:r>
-            <a:endParaRPr lang="de-CH" sz="1100" dirty="0"/>
-          </a:p>
-        </p:txBody>
-      </p:sp>
-      <p:sp>
-        <p:nvSpPr>
-          <p:cNvPr id="57" name="TextBox 56"/>
-          <p:cNvSpPr txBox="1"/>
+              <a:rPr lang="en-US" sz="1400" noProof="1" smtClean="0"/>
+              <a:t>PhantomJS is used to create the .har-File when /analyzeurl is called. It will use netsniff.js for creating the HAR.</a:t>
+            </a:r>
+            <a:endParaRPr lang="en-US" sz="1400" noProof="1"/>
+          </a:p>
+        </p:txBody>
+      </p:sp>
+      <p:pic>
+        <p:nvPicPr>
+          <p:cNvPr id="1026" name="Picture 2"/>
+          <p:cNvPicPr>
+            <a:picLocks noChangeAspect="1" noChangeArrowheads="1"/>
+          </p:cNvPicPr>
           <p:nvPr/>
-        </p:nvSpPr>
-        <p:spPr>
-          <a:xfrm>
-            <a:off x="6336745" y="4992936"/>
-            <a:ext cx="1314784" cy="430887"/>
+        </p:nvPicPr>
+        <p:blipFill>
+          <a:blip r:embed="rId2">
+            <a:extLst>
+              <a:ext uri="{28A0092B-C50C-407E-A947-70E740481C1C}">
+                <a14:useLocalDpi xmlns:a14="http://schemas.microsoft.com/office/drawing/2010/main" val="0"/>
+              </a:ext>
+            </a:extLst>
+          </a:blip>
+          <a:srcRect/>
+          <a:stretch>
+            <a:fillRect/>
+          </a:stretch>
+        </p:blipFill>
+        <p:spPr bwMode="auto">
+          <a:xfrm>
+            <a:off x="775081" y="4545199"/>
+            <a:ext cx="3257550" cy="1614487"/>
           </a:xfrm>
           <a:prstGeom prst="rect">
             <a:avLst/>
           </a:prstGeom>
           <a:noFill/>
-        </p:spPr>
-        <p:txBody>
-          <a:bodyPr wrap="none" rtlCol="0">
-            <a:spAutoFit/>
-          </a:bodyPr>
-          <a:lstStyle/>
-          <a:p>
-            <a:r>
-              <a:rPr lang="de-CH" sz="1100" dirty="0" smtClean="0"/>
-              <a:t>5. </a:t>
-            </a:r>
-            <a:r>
-              <a:rPr lang="de-CH" sz="1100" dirty="0" err="1" smtClean="0"/>
-              <a:t>Retrieve</a:t>
-            </a:r>
-            <a:r>
-              <a:rPr lang="de-CH" sz="1100" dirty="0" smtClean="0"/>
-              <a:t> HAR File</a:t>
-            </a:r>
-            <a:br>
-              <a:rPr lang="de-CH" sz="1100" dirty="0" smtClean="0"/>
-            </a:br>
-            <a:r>
-              <a:rPr lang="de-CH" sz="1100" dirty="0" err="1" smtClean="0"/>
-              <a:t>from</a:t>
-            </a:r>
-            <a:r>
-              <a:rPr lang="de-CH" sz="1100" dirty="0" smtClean="0"/>
-              <a:t> </a:t>
-            </a:r>
-            <a:r>
-              <a:rPr lang="de-CH" sz="1100" dirty="0" err="1" smtClean="0"/>
-              <a:t>cache</a:t>
-            </a:r>
-            <a:endParaRPr lang="de-CH" sz="1100" dirty="0"/>
-          </a:p>
-        </p:txBody>
-      </p:sp>
-      <p:sp>
-        <p:nvSpPr>
-          <p:cNvPr id="58" name="TextBox 57"/>
-          <p:cNvSpPr txBox="1"/>
-          <p:nvPr/>
-        </p:nvSpPr>
-        <p:spPr>
-          <a:xfrm>
-            <a:off x="3061099" y="2644164"/>
-            <a:ext cx="1214586" cy="600164"/>
-          </a:xfrm>
-          <a:prstGeom prst="rect">
-            <a:avLst/>
-          </a:prstGeom>
-          <a:noFill/>
-        </p:spPr>
-        <p:txBody>
-          <a:bodyPr wrap="square" rtlCol="0">
-            <a:spAutoFit/>
-          </a:bodyPr>
-          <a:lstStyle/>
-          <a:p>
-            <a:r>
-              <a:rPr lang="de-CH" sz="1100" dirty="0"/>
-              <a:t>7</a:t>
-            </a:r>
-            <a:r>
-              <a:rPr lang="de-CH" sz="1100" dirty="0" smtClean="0"/>
-              <a:t>. Return HTML </a:t>
-            </a:r>
-            <a:r>
-              <a:rPr lang="de-CH" sz="1100" dirty="0" err="1" smtClean="0"/>
-              <a:t>including</a:t>
-            </a:r>
-            <a:r>
-              <a:rPr lang="de-CH" sz="1100" dirty="0" smtClean="0"/>
-              <a:t> JSON</a:t>
-            </a:r>
-            <a:br>
-              <a:rPr lang="de-CH" sz="1100" dirty="0" smtClean="0"/>
-            </a:br>
-            <a:r>
-              <a:rPr lang="de-CH" sz="1100" dirty="0" err="1" smtClean="0"/>
-              <a:t>results</a:t>
-            </a:r>
-            <a:endParaRPr lang="de-CH" sz="1100" dirty="0"/>
-          </a:p>
-        </p:txBody>
-      </p:sp>
-      <p:cxnSp>
-        <p:nvCxnSpPr>
-          <p:cNvPr id="59" name="Straight Arrow Connector 58"/>
-          <p:cNvCxnSpPr>
-            <a:stCxn id="10" idx="2"/>
-          </p:cNvCxnSpPr>
-          <p:nvPr/>
-        </p:nvCxnSpPr>
-        <p:spPr>
-          <a:xfrm>
-            <a:off x="1892224" y="3494311"/>
-            <a:ext cx="1890" cy="777116"/>
-          </a:xfrm>
-          <a:prstGeom prst="straightConnector1">
-            <a:avLst/>
-          </a:prstGeom>
-          <a:ln w="57150">
-            <a:tailEnd type="stealth"/>
+          <a:ln>
+            <a:noFill/>
           </a:ln>
-        </p:spPr>
-        <p:style>
-          <a:lnRef idx="1">
-            <a:schemeClr val="accent1"/>
-          </a:lnRef>
-          <a:fillRef idx="0">
-            <a:schemeClr val="accent1"/>
-          </a:fillRef>
-          <a:effectRef idx="0">
-            <a:schemeClr val="accent1"/>
-          </a:effectRef>
-          <a:fontRef idx="minor">
-            <a:schemeClr val="tx1"/>
-          </a:fontRef>
-        </p:style>
-      </p:cxnSp>
-      <p:pic>
-        <p:nvPicPr>
-          <p:cNvPr id="62" name="Picture 61"/>
-          <p:cNvPicPr>
-            <a:picLocks noChangeAspect="1"/>
-          </p:cNvPicPr>
-          <p:nvPr/>
-        </p:nvPicPr>
-        <p:blipFill>
-          <a:blip r:embed="rId2"/>
-          <a:stretch>
-            <a:fillRect/>
-          </a:stretch>
-        </p:blipFill>
-        <p:spPr>
-          <a:xfrm>
-            <a:off x="797379" y="4271427"/>
-            <a:ext cx="3224991" cy="2017798"/>
-          </a:xfrm>
-          <a:prstGeom prst="rect">
-            <a:avLst/>
-          </a:prstGeom>
+          <a:effectLst/>
+          <a:extLst>
+            <a:ext uri="{909E8E84-426E-40DD-AFC4-6F175D3DCCD1}">
+              <a14:hiddenFill xmlns:a14="http://schemas.microsoft.com/office/drawing/2010/main">
+                <a:solidFill>
+                  <a:schemeClr val="accent1"/>
+                </a:solidFill>
+              </a14:hiddenFill>
+            </a:ext>
+            <a:ext uri="{91240B29-F687-4F45-9708-019B960494DF}">
+              <a14:hiddenLine xmlns:a14="http://schemas.microsoft.com/office/drawing/2010/main" w="9525">
+                <a:solidFill>
+                  <a:schemeClr val="tx1"/>
+                </a:solidFill>
+                <a:miter lim="800000"/>
+                <a:headEnd/>
+                <a:tailEnd/>
+              </a14:hiddenLine>
+            </a:ext>
+            <a:ext uri="{AF507438-7753-43E0-B8FC-AC1667EBCBE1}">
+              <a14:hiddenEffects xmlns:a14="http://schemas.microsoft.com/office/drawing/2010/main">
+                <a:effectLst>
+                  <a:outerShdw dist="35921" dir="2700000" algn="ctr" rotWithShape="0">
+                    <a:schemeClr val="bg2"/>
+                  </a:outerShdw>
+                </a:effectLst>
+              </a14:hiddenEffects>
+            </a:ext>
+          </a:extLst>
         </p:spPr>
       </p:pic>
-      <p:sp>
-        <p:nvSpPr>
-          <p:cNvPr id="64" name="TextBox 63"/>
-          <p:cNvSpPr txBox="1"/>
-          <p:nvPr/>
-        </p:nvSpPr>
-        <p:spPr>
-          <a:xfrm>
-            <a:off x="1949908" y="3571221"/>
-            <a:ext cx="1507554" cy="600164"/>
-          </a:xfrm>
-          <a:prstGeom prst="rect">
-            <a:avLst/>
-          </a:prstGeom>
-          <a:noFill/>
-        </p:spPr>
-        <p:txBody>
-          <a:bodyPr wrap="square" rtlCol="0">
-            <a:spAutoFit/>
-          </a:bodyPr>
-          <a:lstStyle/>
-          <a:p>
-            <a:r>
-              <a:rPr lang="de-CH" sz="1100" dirty="0" smtClean="0"/>
-              <a:t>8. </a:t>
-            </a:r>
-            <a:r>
-              <a:rPr lang="de-CH" sz="1100" dirty="0" err="1" smtClean="0"/>
-              <a:t>Render</a:t>
-            </a:r>
-            <a:r>
-              <a:rPr lang="de-CH" sz="1100" dirty="0" smtClean="0"/>
-              <a:t> Page </a:t>
-            </a:r>
-            <a:r>
-              <a:rPr lang="de-CH" sz="1100" dirty="0" err="1" smtClean="0"/>
-              <a:t>with</a:t>
-            </a:r>
-            <a:r>
-              <a:rPr lang="de-CH" sz="1100" dirty="0" smtClean="0"/>
-              <a:t> </a:t>
-            </a:r>
-            <a:r>
-              <a:rPr lang="de-CH" sz="1100" dirty="0" err="1" smtClean="0"/>
-              <a:t>Javascript</a:t>
-            </a:r>
-            <a:r>
-              <a:rPr lang="de-CH" sz="1100" dirty="0" smtClean="0"/>
-              <a:t> </a:t>
-            </a:r>
-            <a:r>
-              <a:rPr lang="de-CH" sz="1100" dirty="0" err="1" smtClean="0"/>
-              <a:t>based</a:t>
-            </a:r>
-            <a:r>
-              <a:rPr lang="de-CH" sz="1100" dirty="0" smtClean="0"/>
-              <a:t> on </a:t>
-            </a:r>
-            <a:r>
-              <a:rPr lang="de-CH" sz="1100" dirty="0" err="1" smtClean="0"/>
-              <a:t>the</a:t>
-            </a:r>
-            <a:r>
-              <a:rPr lang="de-CH" sz="1100" dirty="0" smtClean="0"/>
-              <a:t> JSON </a:t>
-            </a:r>
-            <a:r>
-              <a:rPr lang="de-CH" sz="1100" dirty="0" err="1" smtClean="0"/>
-              <a:t>Results</a:t>
-            </a:r>
-            <a:endParaRPr lang="de-CH" sz="1100" dirty="0"/>
-          </a:p>
-        </p:txBody>
-      </p:sp>
     </p:spTree>
     <p:extLst>
       <p:ext uri="{BB962C8B-B14F-4D97-AF65-F5344CB8AC3E}">
@@ -4314,7 +4174,7 @@
     </a:clrScheme>
     <a:fontScheme name="Office">
       <a:majorFont>
-        <a:latin typeface="Calibri Light" panose="020F0302020204030204"/>
+        <a:latin typeface="Calibri Light"/>
         <a:ea typeface=""/>
         <a:cs typeface=""/>
         <a:font script="Jpan" typeface="游ゴシック Light"/>
@@ -4349,7 +4209,7 @@
         <a:font script="Geor" typeface="Sylfaen"/>
       </a:majorFont>
       <a:minorFont>
-        <a:latin typeface="Calibri" panose="020F0502020204030204"/>
+        <a:latin typeface="Calibri"/>
         <a:ea typeface=""/>
         <a:cs typeface=""/>
         <a:font script="Jpan" typeface="游ゴシック"/>
@@ -4526,7 +4386,7 @@
   <a:extraClrSchemeLst/>
   <a:extLst>
     <a:ext uri="{05A4C25C-085E-4340-85A3-A5531E510DB2}">
-      <thm15:themeFamily xmlns:thm15="http://schemas.microsoft.com/office/thememl/2012/main" name="Office Theme" id="{62F939B6-93AF-4DB8-9C6B-D6C7DFDC589F}" vid="{4A3C46E8-61CC-4603-A589-7422A47A8E4A}"/>
+      <thm15:themeFamily xmlns:thm15="http://schemas.microsoft.com/office/thememl/2012/main" xmlns="" name="Office Theme" id="{62F939B6-93AF-4DB8-9C6B-D6C7DFDC589F}" vid="{4A3C46E8-61CC-4603-A589-7422A47A8E4A}"/>
     </a:ext>
   </a:extLst>
 </a:theme>

</xml_diff>